<commit_message>
Updated presentation draft with structure
</commit_message>
<xml_diff>
--- a/CaseStudies/CaseStudy2/doc/01-DesignThinking/Task_1_Presentation.pptx
+++ b/CaseStudies/CaseStudy2/doc/01-DesignThinking/Task_1_Presentation.pptx
@@ -5,10 +5,16 @@
     <p:sldMasterId id="2147483669" r:id="rId4"/>
   </p:sldMasterIdLst>
   <p:notesMasterIdLst>
-    <p:notesMasterId r:id="rId6"/>
+    <p:notesMasterId r:id="rId12"/>
   </p:notesMasterIdLst>
   <p:sldIdLst>
     <p:sldId id="256" r:id="rId5"/>
+    <p:sldId id="257" r:id="rId6"/>
+    <p:sldId id="258" r:id="rId7"/>
+    <p:sldId id="259" r:id="rId8"/>
+    <p:sldId id="260" r:id="rId9"/>
+    <p:sldId id="261" r:id="rId10"/>
+    <p:sldId id="262" r:id="rId11"/>
   </p:sldIdLst>
   <p:sldSz cx="12207875" cy="6858000"/>
   <p:notesSz cx="6797675" cy="9872663"/>
@@ -6678,12 +6684,22 @@
                 <a:latin typeface="Lucida Sans" pitchFamily="34" charset="0"/>
                 <a:cs typeface="Lucida Sans Unicode" pitchFamily="34" charset="0"/>
               </a:rPr>
-              <a:t>Spitex und sozial Phobie</a:t>
-            </a:r>
-            <a:endParaRPr lang="de-DE" dirty="0" smtClean="0">
-              <a:latin typeface="Lucida Sans" pitchFamily="34" charset="0"/>
-              <a:cs typeface="Lucida Sans Unicode" pitchFamily="34" charset="0"/>
-            </a:endParaRPr>
+              <a:t>Spitex und </a:t>
+            </a:r>
+            <a:r>
+              <a:rPr lang="de-DE" dirty="0" smtClean="0">
+                <a:latin typeface="Lucida Sans" pitchFamily="34" charset="0"/>
+                <a:cs typeface="Lucida Sans Unicode" pitchFamily="34" charset="0"/>
+              </a:rPr>
+              <a:t>soziale </a:t>
+            </a:r>
+            <a:r>
+              <a:rPr lang="de-DE" dirty="0" smtClean="0">
+                <a:latin typeface="Lucida Sans" pitchFamily="34" charset="0"/>
+                <a:cs typeface="Lucida Sans Unicode" pitchFamily="34" charset="0"/>
+              </a:rPr>
+              <a:t>Phobie</a:t>
+            </a:r>
           </a:p>
         </p:txBody>
       </p:sp>
@@ -6737,7 +6753,7 @@
                 <a:latin typeface="Lucida Sans" pitchFamily="34" charset="0"/>
                 <a:cs typeface="Lucida Sans Unicode" pitchFamily="34" charset="0"/>
               </a:rPr>
-              <a:t>Desingn</a:t>
+              <a:t>Designthinking</a:t>
             </a:r>
             <a:r>
               <a:rPr lang="de-DE" dirty="0" smtClean="0">
@@ -6747,18 +6763,11 @@
               <a:t> </a:t>
             </a:r>
             <a:r>
-              <a:rPr lang="de-DE" dirty="0" err="1" smtClean="0">
-                <a:latin typeface="Lucida Sans" pitchFamily="34" charset="0"/>
-                <a:cs typeface="Lucida Sans Unicode" pitchFamily="34" charset="0"/>
-              </a:rPr>
-              <a:t>thinking</a:t>
-            </a:r>
-            <a:r>
               <a:rPr lang="de-DE" dirty="0" smtClean="0">
                 <a:latin typeface="Lucida Sans" pitchFamily="34" charset="0"/>
                 <a:cs typeface="Lucida Sans Unicode" pitchFamily="34" charset="0"/>
               </a:rPr>
-              <a:t> Prozess und erste Ideen</a:t>
+              <a:t>Prozess und erste Ideen</a:t>
             </a:r>
           </a:p>
           <a:p>
@@ -6778,7 +6787,28 @@
               <a:t>Gfeller</a:t>
             </a:r>
             <a:r>
-              <a:rPr lang="de-DE" smtClean="0">
+              <a:rPr lang="de-DE" dirty="0" smtClean="0">
+                <a:latin typeface="Lucida Sans" pitchFamily="34" charset="0"/>
+                <a:cs typeface="Lucida Sans Unicode" pitchFamily="34" charset="0"/>
+              </a:rPr>
+              <a:t>, O. </a:t>
+            </a:r>
+            <a:r>
+              <a:rPr lang="de-DE" dirty="0" err="1" smtClean="0">
+                <a:latin typeface="Lucida Sans" pitchFamily="34" charset="0"/>
+                <a:cs typeface="Lucida Sans Unicode" pitchFamily="34" charset="0"/>
+              </a:rPr>
+              <a:t>J</a:t>
+            </a:r>
+            <a:r>
+              <a:rPr lang="de-DE" dirty="0" err="1" smtClean="0">
+                <a:latin typeface="Lucida Sans" pitchFamily="34" charset="0"/>
+                <a:cs typeface="Lucida Sans Unicode" pitchFamily="34" charset="0"/>
+              </a:rPr>
+              <a:t>emal</a:t>
+            </a:r>
+            <a:r>
+              <a:rPr lang="de-DE" dirty="0" smtClean="0">
                 <a:latin typeface="Lucida Sans" pitchFamily="34" charset="0"/>
                 <a:cs typeface="Lucida Sans Unicode" pitchFamily="34" charset="0"/>
               </a:rPr>
@@ -6805,10 +6835,6 @@
               </a:rPr>
               <a:t>, M. Ziegler</a:t>
             </a:r>
-            <a:endParaRPr lang="de-DE" dirty="0" smtClean="0">
-              <a:latin typeface="Lucida Sans" pitchFamily="34" charset="0"/>
-              <a:cs typeface="Lucida Sans Unicode" pitchFamily="34" charset="0"/>
-            </a:endParaRPr>
           </a:p>
         </p:txBody>
       </p:sp>
@@ -6867,6 +6893,531 @@
         </p:txBody>
       </p:sp>
     </p:spTree>
+  </p:cSld>
+  <p:clrMapOvr>
+    <a:masterClrMapping/>
+  </p:clrMapOvr>
+  <p:timing>
+    <p:tnLst>
+      <p:par>
+        <p:cTn id="1" dur="indefinite" restart="never" nodeType="tmRoot"/>
+      </p:par>
+    </p:tnLst>
+  </p:timing>
+</p:sld>
+</file>
+
+<file path=ppt/slides/slide2.xml><?xml version="1.0" encoding="utf-8"?>
+<p:sld xmlns:a="http://schemas.openxmlformats.org/drawingml/2006/main" xmlns:r="http://schemas.openxmlformats.org/officeDocument/2006/relationships" xmlns:p="http://schemas.openxmlformats.org/presentationml/2006/main">
+  <p:cSld>
+    <p:spTree>
+      <p:nvGrpSpPr>
+        <p:cNvPr id="1" name=""/>
+        <p:cNvGrpSpPr/>
+        <p:nvPr/>
+      </p:nvGrpSpPr>
+      <p:grpSpPr>
+        <a:xfrm>
+          <a:off x="0" y="0"/>
+          <a:ext cx="0" cy="0"/>
+          <a:chOff x="0" y="0"/>
+          <a:chExt cx="0" cy="0"/>
+        </a:xfrm>
+      </p:grpSpPr>
+      <p:sp>
+        <p:nvSpPr>
+          <p:cNvPr id="6" name="Inhaltsplatzhalter 5"/>
+          <p:cNvSpPr>
+            <a:spLocks noGrp="1"/>
+          </p:cNvSpPr>
+          <p:nvPr>
+            <p:ph sz="half" idx="1"/>
+          </p:nvPr>
+        </p:nvSpPr>
+        <p:spPr/>
+        <p:txBody>
+          <a:bodyPr/>
+          <a:lstStyle/>
+          <a:p>
+            <a:r>
+              <a:rPr lang="de-CH" dirty="0" smtClean="0"/>
+              <a:t>Nicht zu verwechseln mit Schüchternheit</a:t>
+            </a:r>
+          </a:p>
+          <a:p>
+            <a:r>
+              <a:rPr lang="de-CH" dirty="0" smtClean="0"/>
+              <a:t>Angst vor dem Kontakt mit unbekannten Personen</a:t>
+            </a:r>
+          </a:p>
+          <a:p>
+            <a:r>
+              <a:rPr lang="de-CH" dirty="0" smtClean="0"/>
+              <a:t>Kann diverse Aktivitäten im alltäglichen Leben </a:t>
+            </a:r>
+            <a:r>
+              <a:rPr lang="de-CH" dirty="0" err="1" smtClean="0"/>
+              <a:t>beinflussen</a:t>
+            </a:r>
+            <a:r>
+              <a:rPr lang="de-CH" dirty="0" smtClean="0"/>
+              <a:t> wie z.B.</a:t>
+            </a:r>
+          </a:p>
+          <a:p>
+            <a:pPr lvl="1"/>
+            <a:r>
+              <a:rPr lang="de-CH" dirty="0" smtClean="0"/>
+              <a:t>Einkaufen</a:t>
+            </a:r>
+          </a:p>
+          <a:p>
+            <a:pPr lvl="1"/>
+            <a:r>
+              <a:rPr lang="de-CH" smtClean="0"/>
+              <a:t>Auswärts Essen</a:t>
+            </a:r>
+            <a:endParaRPr lang="de-CH" dirty="0"/>
+          </a:p>
+        </p:txBody>
+      </p:sp>
+      <p:sp>
+        <p:nvSpPr>
+          <p:cNvPr id="5" name="Titel 4"/>
+          <p:cNvSpPr>
+            <a:spLocks noGrp="1"/>
+          </p:cNvSpPr>
+          <p:nvPr>
+            <p:ph type="ctrTitle"/>
+          </p:nvPr>
+        </p:nvSpPr>
+        <p:spPr/>
+        <p:txBody>
+          <a:bodyPr/>
+          <a:lstStyle/>
+          <a:p>
+            <a:r>
+              <a:rPr lang="de-CH" dirty="0" smtClean="0"/>
+              <a:t>Was ist soziale Phobie?</a:t>
+            </a:r>
+            <a:endParaRPr lang="de-CH" dirty="0"/>
+          </a:p>
+        </p:txBody>
+      </p:sp>
+    </p:spTree>
+    <p:extLst>
+      <p:ext uri="{BB962C8B-B14F-4D97-AF65-F5344CB8AC3E}">
+        <p14:creationId xmlns:p14="http://schemas.microsoft.com/office/powerpoint/2010/main" val="1827317066"/>
+      </p:ext>
+    </p:extLst>
+  </p:cSld>
+  <p:clrMapOvr>
+    <a:masterClrMapping/>
+  </p:clrMapOvr>
+  <p:timing>
+    <p:tnLst>
+      <p:par>
+        <p:cTn id="1" dur="indefinite" restart="never" nodeType="tmRoot"/>
+      </p:par>
+    </p:tnLst>
+  </p:timing>
+</p:sld>
+</file>
+
+<file path=ppt/slides/slide3.xml><?xml version="1.0" encoding="utf-8"?>
+<p:sld xmlns:a="http://schemas.openxmlformats.org/drawingml/2006/main" xmlns:r="http://schemas.openxmlformats.org/officeDocument/2006/relationships" xmlns:p="http://schemas.openxmlformats.org/presentationml/2006/main">
+  <p:cSld>
+    <p:spTree>
+      <p:nvGrpSpPr>
+        <p:cNvPr id="1" name=""/>
+        <p:cNvGrpSpPr/>
+        <p:nvPr/>
+      </p:nvGrpSpPr>
+      <p:grpSpPr>
+        <a:xfrm>
+          <a:off x="0" y="0"/>
+          <a:ext cx="0" cy="0"/>
+          <a:chOff x="0" y="0"/>
+          <a:chExt cx="0" cy="0"/>
+        </a:xfrm>
+      </p:grpSpPr>
+      <p:sp>
+        <p:nvSpPr>
+          <p:cNvPr id="2" name="Inhaltsplatzhalter 1"/>
+          <p:cNvSpPr>
+            <a:spLocks noGrp="1"/>
+          </p:cNvSpPr>
+          <p:nvPr>
+            <p:ph sz="half" idx="1"/>
+          </p:nvPr>
+        </p:nvSpPr>
+        <p:spPr/>
+        <p:txBody>
+          <a:bodyPr/>
+          <a:lstStyle/>
+          <a:p>
+            <a:endParaRPr lang="de-CH"/>
+          </a:p>
+        </p:txBody>
+      </p:sp>
+      <p:sp>
+        <p:nvSpPr>
+          <p:cNvPr id="3" name="Titel 2"/>
+          <p:cNvSpPr>
+            <a:spLocks noGrp="1"/>
+          </p:cNvSpPr>
+          <p:nvPr>
+            <p:ph type="ctrTitle"/>
+          </p:nvPr>
+        </p:nvSpPr>
+        <p:spPr/>
+        <p:txBody>
+          <a:bodyPr/>
+          <a:lstStyle/>
+          <a:p>
+            <a:r>
+              <a:rPr lang="de-CH" dirty="0" smtClean="0"/>
+              <a:t>Erste Interviews</a:t>
+            </a:r>
+            <a:endParaRPr lang="de-CH" dirty="0"/>
+          </a:p>
+        </p:txBody>
+      </p:sp>
+    </p:spTree>
+    <p:extLst>
+      <p:ext uri="{BB962C8B-B14F-4D97-AF65-F5344CB8AC3E}">
+        <p14:creationId xmlns:p14="http://schemas.microsoft.com/office/powerpoint/2010/main" val="1312568616"/>
+      </p:ext>
+    </p:extLst>
+  </p:cSld>
+  <p:clrMapOvr>
+    <a:masterClrMapping/>
+  </p:clrMapOvr>
+  <p:timing>
+    <p:tnLst>
+      <p:par>
+        <p:cTn id="1" dur="indefinite" restart="never" nodeType="tmRoot"/>
+      </p:par>
+    </p:tnLst>
+  </p:timing>
+</p:sld>
+</file>
+
+<file path=ppt/slides/slide4.xml><?xml version="1.0" encoding="utf-8"?>
+<p:sld xmlns:a="http://schemas.openxmlformats.org/drawingml/2006/main" xmlns:r="http://schemas.openxmlformats.org/officeDocument/2006/relationships" xmlns:p="http://schemas.openxmlformats.org/presentationml/2006/main">
+  <p:cSld>
+    <p:spTree>
+      <p:nvGrpSpPr>
+        <p:cNvPr id="1" name=""/>
+        <p:cNvGrpSpPr/>
+        <p:nvPr/>
+      </p:nvGrpSpPr>
+      <p:grpSpPr>
+        <a:xfrm>
+          <a:off x="0" y="0"/>
+          <a:ext cx="0" cy="0"/>
+          <a:chOff x="0" y="0"/>
+          <a:chExt cx="0" cy="0"/>
+        </a:xfrm>
+      </p:grpSpPr>
+      <p:pic>
+        <p:nvPicPr>
+          <p:cNvPr id="4" name="Inhaltsplatzhalter 3"/>
+          <p:cNvPicPr>
+            <a:picLocks noGrp="1" noChangeAspect="1"/>
+          </p:cNvPicPr>
+          <p:nvPr>
+            <p:ph sz="half" idx="1"/>
+          </p:nvPr>
+        </p:nvPicPr>
+        <p:blipFill rotWithShape="1">
+          <a:blip r:embed="rId2">
+            <a:extLst>
+              <a:ext uri="{28A0092B-C50C-407E-A947-70E740481C1C}">
+                <a14:useLocalDpi xmlns:a14="http://schemas.microsoft.com/office/drawing/2010/main" val="0"/>
+              </a:ext>
+            </a:extLst>
+          </a:blip>
+          <a:srcRect t="27517" b="17636"/>
+          <a:stretch/>
+        </p:blipFill>
+        <p:spPr>
+          <a:xfrm>
+            <a:off x="457199" y="1163514"/>
+            <a:ext cx="11435383" cy="4703885"/>
+          </a:xfrm>
+        </p:spPr>
+      </p:pic>
+      <p:sp>
+        <p:nvSpPr>
+          <p:cNvPr id="3" name="Titel 2"/>
+          <p:cNvSpPr>
+            <a:spLocks noGrp="1"/>
+          </p:cNvSpPr>
+          <p:nvPr>
+            <p:ph type="ctrTitle"/>
+          </p:nvPr>
+        </p:nvSpPr>
+        <p:spPr/>
+        <p:txBody>
+          <a:bodyPr/>
+          <a:lstStyle/>
+          <a:p>
+            <a:r>
+              <a:rPr lang="de-CH" dirty="0" smtClean="0"/>
+              <a:t>Erkenntnisse aus ersten Interviews</a:t>
+            </a:r>
+            <a:endParaRPr lang="de-CH" dirty="0"/>
+          </a:p>
+        </p:txBody>
+      </p:sp>
+    </p:spTree>
+    <p:extLst>
+      <p:ext uri="{BB962C8B-B14F-4D97-AF65-F5344CB8AC3E}">
+        <p14:creationId xmlns:p14="http://schemas.microsoft.com/office/powerpoint/2010/main" val="418040089"/>
+      </p:ext>
+    </p:extLst>
+  </p:cSld>
+  <p:clrMapOvr>
+    <a:masterClrMapping/>
+  </p:clrMapOvr>
+  <p:timing>
+    <p:tnLst>
+      <p:par>
+        <p:cTn id="1" dur="indefinite" restart="never" nodeType="tmRoot"/>
+      </p:par>
+    </p:tnLst>
+  </p:timing>
+</p:sld>
+</file>
+
+<file path=ppt/slides/slide5.xml><?xml version="1.0" encoding="utf-8"?>
+<p:sld xmlns:a="http://schemas.openxmlformats.org/drawingml/2006/main" xmlns:r="http://schemas.openxmlformats.org/officeDocument/2006/relationships" xmlns:p="http://schemas.openxmlformats.org/presentationml/2006/main">
+  <p:cSld>
+    <p:spTree>
+      <p:nvGrpSpPr>
+        <p:cNvPr id="1" name=""/>
+        <p:cNvGrpSpPr/>
+        <p:nvPr/>
+      </p:nvGrpSpPr>
+      <p:grpSpPr>
+        <a:xfrm>
+          <a:off x="0" y="0"/>
+          <a:ext cx="0" cy="0"/>
+          <a:chOff x="0" y="0"/>
+          <a:chExt cx="0" cy="0"/>
+        </a:xfrm>
+      </p:grpSpPr>
+      <p:sp>
+        <p:nvSpPr>
+          <p:cNvPr id="2" name="Inhaltsplatzhalter 1"/>
+          <p:cNvSpPr>
+            <a:spLocks noGrp="1"/>
+          </p:cNvSpPr>
+          <p:nvPr>
+            <p:ph sz="half" idx="1"/>
+          </p:nvPr>
+        </p:nvSpPr>
+        <p:spPr/>
+        <p:txBody>
+          <a:bodyPr/>
+          <a:lstStyle/>
+          <a:p>
+            <a:endParaRPr lang="de-CH"/>
+          </a:p>
+        </p:txBody>
+      </p:sp>
+      <p:sp>
+        <p:nvSpPr>
+          <p:cNvPr id="3" name="Titel 2"/>
+          <p:cNvSpPr>
+            <a:spLocks noGrp="1"/>
+          </p:cNvSpPr>
+          <p:nvPr>
+            <p:ph type="ctrTitle"/>
+          </p:nvPr>
+        </p:nvSpPr>
+        <p:spPr/>
+        <p:txBody>
+          <a:bodyPr/>
+          <a:lstStyle/>
+          <a:p>
+            <a:r>
+              <a:rPr lang="de-CH" dirty="0" smtClean="0"/>
+              <a:t>Storyboards und </a:t>
+            </a:r>
+            <a:r>
+              <a:rPr lang="de-CH" dirty="0" err="1" smtClean="0"/>
+              <a:t>Personas</a:t>
+            </a:r>
+            <a:endParaRPr lang="de-CH" dirty="0"/>
+          </a:p>
+        </p:txBody>
+      </p:sp>
+    </p:spTree>
+    <p:extLst>
+      <p:ext uri="{BB962C8B-B14F-4D97-AF65-F5344CB8AC3E}">
+        <p14:creationId xmlns:p14="http://schemas.microsoft.com/office/powerpoint/2010/main" val="3584336749"/>
+      </p:ext>
+    </p:extLst>
+  </p:cSld>
+  <p:clrMapOvr>
+    <a:masterClrMapping/>
+  </p:clrMapOvr>
+  <p:timing>
+    <p:tnLst>
+      <p:par>
+        <p:cTn id="1" dur="indefinite" restart="never" nodeType="tmRoot"/>
+      </p:par>
+    </p:tnLst>
+  </p:timing>
+</p:sld>
+</file>
+
+<file path=ppt/slides/slide6.xml><?xml version="1.0" encoding="utf-8"?>
+<p:sld xmlns:a="http://schemas.openxmlformats.org/drawingml/2006/main" xmlns:r="http://schemas.openxmlformats.org/officeDocument/2006/relationships" xmlns:p="http://schemas.openxmlformats.org/presentationml/2006/main">
+  <p:cSld>
+    <p:spTree>
+      <p:nvGrpSpPr>
+        <p:cNvPr id="1" name=""/>
+        <p:cNvGrpSpPr/>
+        <p:nvPr/>
+      </p:nvGrpSpPr>
+      <p:grpSpPr>
+        <a:xfrm>
+          <a:off x="0" y="0"/>
+          <a:ext cx="0" cy="0"/>
+          <a:chOff x="0" y="0"/>
+          <a:chExt cx="0" cy="0"/>
+        </a:xfrm>
+      </p:grpSpPr>
+      <p:sp>
+        <p:nvSpPr>
+          <p:cNvPr id="2" name="Inhaltsplatzhalter 1"/>
+          <p:cNvSpPr>
+            <a:spLocks noGrp="1"/>
+          </p:cNvSpPr>
+          <p:nvPr>
+            <p:ph sz="half" idx="1"/>
+          </p:nvPr>
+        </p:nvSpPr>
+        <p:spPr/>
+        <p:txBody>
+          <a:bodyPr/>
+          <a:lstStyle/>
+          <a:p>
+            <a:endParaRPr lang="de-CH"/>
+          </a:p>
+        </p:txBody>
+      </p:sp>
+      <p:sp>
+        <p:nvSpPr>
+          <p:cNvPr id="3" name="Titel 2"/>
+          <p:cNvSpPr>
+            <a:spLocks noGrp="1"/>
+          </p:cNvSpPr>
+          <p:nvPr>
+            <p:ph type="ctrTitle"/>
+          </p:nvPr>
+        </p:nvSpPr>
+        <p:spPr/>
+        <p:txBody>
+          <a:bodyPr/>
+          <a:lstStyle/>
+          <a:p>
+            <a:r>
+              <a:rPr lang="de-CH" dirty="0" smtClean="0"/>
+              <a:t>2. Interview</a:t>
+            </a:r>
+            <a:endParaRPr lang="de-CH" dirty="0"/>
+          </a:p>
+        </p:txBody>
+      </p:sp>
+    </p:spTree>
+    <p:extLst>
+      <p:ext uri="{BB962C8B-B14F-4D97-AF65-F5344CB8AC3E}">
+        <p14:creationId xmlns:p14="http://schemas.microsoft.com/office/powerpoint/2010/main" val="2543167769"/>
+      </p:ext>
+    </p:extLst>
+  </p:cSld>
+  <p:clrMapOvr>
+    <a:masterClrMapping/>
+  </p:clrMapOvr>
+  <p:timing>
+    <p:tnLst>
+      <p:par>
+        <p:cTn id="1" dur="indefinite" restart="never" nodeType="tmRoot"/>
+      </p:par>
+    </p:tnLst>
+  </p:timing>
+</p:sld>
+</file>
+
+<file path=ppt/slides/slide7.xml><?xml version="1.0" encoding="utf-8"?>
+<p:sld xmlns:a="http://schemas.openxmlformats.org/drawingml/2006/main" xmlns:r="http://schemas.openxmlformats.org/officeDocument/2006/relationships" xmlns:p="http://schemas.openxmlformats.org/presentationml/2006/main">
+  <p:cSld>
+    <p:spTree>
+      <p:nvGrpSpPr>
+        <p:cNvPr id="1" name=""/>
+        <p:cNvGrpSpPr/>
+        <p:nvPr/>
+      </p:nvGrpSpPr>
+      <p:grpSpPr>
+        <a:xfrm>
+          <a:off x="0" y="0"/>
+          <a:ext cx="0" cy="0"/>
+          <a:chOff x="0" y="0"/>
+          <a:chExt cx="0" cy="0"/>
+        </a:xfrm>
+      </p:grpSpPr>
+      <p:sp>
+        <p:nvSpPr>
+          <p:cNvPr id="2" name="Inhaltsplatzhalter 1"/>
+          <p:cNvSpPr>
+            <a:spLocks noGrp="1"/>
+          </p:cNvSpPr>
+          <p:nvPr>
+            <p:ph sz="half" idx="1"/>
+          </p:nvPr>
+        </p:nvSpPr>
+        <p:spPr/>
+        <p:txBody>
+          <a:bodyPr/>
+          <a:lstStyle/>
+          <a:p>
+            <a:endParaRPr lang="de-CH"/>
+          </a:p>
+        </p:txBody>
+      </p:sp>
+      <p:sp>
+        <p:nvSpPr>
+          <p:cNvPr id="3" name="Titel 2"/>
+          <p:cNvSpPr>
+            <a:spLocks noGrp="1"/>
+          </p:cNvSpPr>
+          <p:nvPr>
+            <p:ph type="ctrTitle"/>
+          </p:nvPr>
+        </p:nvSpPr>
+        <p:spPr/>
+        <p:txBody>
+          <a:bodyPr/>
+          <a:lstStyle/>
+          <a:p>
+            <a:r>
+              <a:rPr lang="de-CH" dirty="0" smtClean="0"/>
+              <a:t>Prototype</a:t>
+            </a:r>
+            <a:endParaRPr lang="de-CH" dirty="0"/>
+          </a:p>
+        </p:txBody>
+      </p:sp>
+    </p:spTree>
+    <p:extLst>
+      <p:ext uri="{BB962C8B-B14F-4D97-AF65-F5344CB8AC3E}">
+        <p14:creationId xmlns:p14="http://schemas.microsoft.com/office/powerpoint/2010/main" val="4059494987"/>
+      </p:ext>
+    </p:extLst>
   </p:cSld>
   <p:clrMapOvr>
     <a:masterClrMapping/>
@@ -7487,31 +8038,6 @@
 </file>
 
 <file path=customXml/item1.xml><?xml version="1.0" encoding="utf-8"?>
-<?mso-contentType ?>
-<FormTemplates xmlns="http://schemas.microsoft.com/sharepoint/v3/contenttype/forms">
-  <Display>DocumentLibraryForm</Display>
-  <Edit>DocumentLibraryForm</Edit>
-  <New>DocumentLibraryForm</New>
-</FormTemplates>
-</file>
-
-<file path=customXml/item2.xml><?xml version="1.0" encoding="utf-8"?>
-<p:properties xmlns:p="http://schemas.microsoft.com/office/2006/metadata/properties" xmlns:xsi="http://www.w3.org/2001/XMLSchema-instance" xmlns:pc="http://schemas.microsoft.com/office/infopath/2007/PartnerControls">
-  <documentManagement>
-    <QMPilot_DokID xmlns="2551ef7e-3b29-44d1-a8ad-ef34c26bfc60">470</QMPilot_DokID>
-    <BfhIntranetDepartmentText xmlns="f6f68f68-5570-446d-b1e6-2310e70d83d3">
-      <Terms xmlns="http://schemas.microsoft.com/office/infopath/2007/PartnerControls">
-        <TermInfo xmlns="http://schemas.microsoft.com/office/infopath/2007/PartnerControls">
-          <TermName xmlns="http://schemas.microsoft.com/office/infopath/2007/PartnerControls">Vorlage</TermName>
-          <TermId xmlns="http://schemas.microsoft.com/office/infopath/2007/PartnerControls">de1a6d3c-ac6a-4b34-8edd-308eb81066db</TermId>
-        </TermInfo>
-      </Terms>
-    </BfhIntranetDepartmentText>
-  </documentManagement>
-</p:properties>
-</file>
-
-<file path=customXml/item3.xml><?xml version="1.0" encoding="utf-8"?>
 <ct:contentTypeSchema xmlns:ct="http://schemas.microsoft.com/office/2006/metadata/contentType" xmlns:ma="http://schemas.microsoft.com/office/2006/metadata/properties/metaAttributes" ct:_="" ma:_="" ma:contentTypeName="QMPilot_ContentType" ma:contentTypeID="0x0101009127C3B567804923A8661E062BBD8EF500AB8983C84EF542A7976DC8547A5CDC52001BD440F45714504284DA526949208683" ma:contentTypeVersion="2" ma:contentTypeDescription="Create a new document." ma:contentTypeScope="" ma:versionID="e95561030a1194bdd1903eaf06697dcb">
   <xsd:schema xmlns:xsd="http://www.w3.org/2001/XMLSchema" xmlns:xs="http://www.w3.org/2001/XMLSchema" xmlns:p="http://schemas.microsoft.com/office/2006/metadata/properties" xmlns:ns2="f6f68f68-5570-446d-b1e6-2310e70d83d3" xmlns:ns3="2551ef7e-3b29-44d1-a8ad-ef34c26bfc60" targetNamespace="http://schemas.microsoft.com/office/2006/metadata/properties" ma:root="true" ma:fieldsID="a12ba8f3cc9838c64a8c8804efb93033" ns2:_="" ns3:_="">
     <xsd:import namespace="f6f68f68-5570-446d-b1e6-2310e70d83d3"/>
@@ -7650,10 +8176,46 @@
 </ct:contentTypeSchema>
 </file>
 
+<file path=customXml/item2.xml><?xml version="1.0" encoding="utf-8"?>
+<p:properties xmlns:p="http://schemas.microsoft.com/office/2006/metadata/properties" xmlns:xsi="http://www.w3.org/2001/XMLSchema-instance" xmlns:pc="http://schemas.microsoft.com/office/infopath/2007/PartnerControls">
+  <documentManagement>
+    <QMPilot_DokID xmlns="2551ef7e-3b29-44d1-a8ad-ef34c26bfc60">470</QMPilot_DokID>
+    <BfhIntranetDepartmentText xmlns="f6f68f68-5570-446d-b1e6-2310e70d83d3">
+      <Terms xmlns="http://schemas.microsoft.com/office/infopath/2007/PartnerControls">
+        <TermInfo xmlns="http://schemas.microsoft.com/office/infopath/2007/PartnerControls">
+          <TermName xmlns="http://schemas.microsoft.com/office/infopath/2007/PartnerControls">Vorlage</TermName>
+          <TermId xmlns="http://schemas.microsoft.com/office/infopath/2007/PartnerControls">de1a6d3c-ac6a-4b34-8edd-308eb81066db</TermId>
+        </TermInfo>
+      </Terms>
+    </BfhIntranetDepartmentText>
+  </documentManagement>
+</p:properties>
+</file>
+
+<file path=customXml/item3.xml><?xml version="1.0" encoding="utf-8"?>
+<?mso-contentType ?>
+<FormTemplates xmlns="http://schemas.microsoft.com/sharepoint/v3/contenttype/forms">
+  <Display>DocumentLibraryForm</Display>
+  <Edit>DocumentLibraryForm</Edit>
+  <New>DocumentLibraryForm</New>
+</FormTemplates>
+</file>
+
 <file path=customXml/itemProps1.xml><?xml version="1.0" encoding="utf-8"?>
-<ds:datastoreItem xmlns:ds="http://schemas.openxmlformats.org/officeDocument/2006/customXml" ds:itemID="{9D47BE21-B709-4D16-ABB2-11D40677E528}">
+<ds:datastoreItem xmlns:ds="http://schemas.openxmlformats.org/officeDocument/2006/customXml" ds:itemID="{8828F31F-F05E-4BE4-9E3B-C5B238FEF8C0}">
   <ds:schemaRefs>
-    <ds:schemaRef ds:uri="http://schemas.microsoft.com/sharepoint/v3/contenttype/forms"/>
+    <ds:schemaRef ds:uri="http://schemas.microsoft.com/office/2006/metadata/contentType"/>
+    <ds:schemaRef ds:uri="http://schemas.microsoft.com/office/2006/metadata/properties/metaAttributes"/>
+    <ds:schemaRef ds:uri="http://www.w3.org/2001/XMLSchema"/>
+    <ds:schemaRef ds:uri="http://schemas.microsoft.com/office/2006/metadata/properties"/>
+    <ds:schemaRef ds:uri="f6f68f68-5570-446d-b1e6-2310e70d83d3"/>
+    <ds:schemaRef ds:uri="2551ef7e-3b29-44d1-a8ad-ef34c26bfc60"/>
+    <ds:schemaRef ds:uri="http://schemas.microsoft.com/office/2006/documentManagement/types"/>
+    <ds:schemaRef ds:uri="http://schemas.microsoft.com/office/infopath/2007/PartnerControls"/>
+    <ds:schemaRef ds:uri="http://schemas.openxmlformats.org/package/2006/metadata/core-properties"/>
+    <ds:schemaRef ds:uri="http://purl.org/dc/elements/1.1/"/>
+    <ds:schemaRef ds:uri="http://purl.org/dc/terms/"/>
+    <ds:schemaRef ds:uri="http://schemas.microsoft.com/internal/obd"/>
   </ds:schemaRefs>
 </ds:datastoreItem>
 </file>
@@ -7670,20 +8232,9 @@
 </file>
 
 <file path=customXml/itemProps3.xml><?xml version="1.0" encoding="utf-8"?>
-<ds:datastoreItem xmlns:ds="http://schemas.openxmlformats.org/officeDocument/2006/customXml" ds:itemID="{8828F31F-F05E-4BE4-9E3B-C5B238FEF8C0}">
+<ds:datastoreItem xmlns:ds="http://schemas.openxmlformats.org/officeDocument/2006/customXml" ds:itemID="{9D47BE21-B709-4D16-ABB2-11D40677E528}">
   <ds:schemaRefs>
-    <ds:schemaRef ds:uri="http://schemas.microsoft.com/office/2006/metadata/contentType"/>
-    <ds:schemaRef ds:uri="http://schemas.microsoft.com/office/2006/metadata/properties/metaAttributes"/>
-    <ds:schemaRef ds:uri="http://www.w3.org/2001/XMLSchema"/>
-    <ds:schemaRef ds:uri="http://schemas.microsoft.com/office/2006/metadata/properties"/>
-    <ds:schemaRef ds:uri="f6f68f68-5570-446d-b1e6-2310e70d83d3"/>
-    <ds:schemaRef ds:uri="2551ef7e-3b29-44d1-a8ad-ef34c26bfc60"/>
-    <ds:schemaRef ds:uri="http://schemas.microsoft.com/office/2006/documentManagement/types"/>
-    <ds:schemaRef ds:uri="http://schemas.microsoft.com/office/infopath/2007/PartnerControls"/>
-    <ds:schemaRef ds:uri="http://schemas.openxmlformats.org/package/2006/metadata/core-properties"/>
-    <ds:schemaRef ds:uri="http://purl.org/dc/elements/1.1/"/>
-    <ds:schemaRef ds:uri="http://purl.org/dc/terms/"/>
-    <ds:schemaRef ds:uri="http://schemas.microsoft.com/internal/obd"/>
+    <ds:schemaRef ds:uri="http://schemas.microsoft.com/sharepoint/v3/contenttype/forms"/>
   </ds:schemaRefs>
 </ds:datastoreItem>
 </file>
</xml_diff>